<commit_message>
Add endpoints and high level arch slide
</commit_message>
<xml_diff>
--- a/documentation/ProiectProductionEngineering.pptx
+++ b/documentation/ProiectProductionEngineering.pptx
@@ -13,6 +13,7 @@
     <p:sldId id="261" r:id="rId7"/>
     <p:sldId id="262" r:id="rId8"/>
     <p:sldId id="263" r:id="rId9"/>
+    <p:sldId id="264" r:id="rId10"/>
   </p:sldIdLst>
   <p:sldSz cx="12192000" cy="6858000"/>
   <p:notesSz cx="6858000" cy="9144000"/>
@@ -111,6 +112,11 @@
       </a:defRPr>
     </a:lvl9pPr>
   </p:defaultTextStyle>
+  <p:extLst>
+    <p:ext uri="{EFAFB233-063F-42B5-8137-9DF3F51BA10A}">
+      <p15:sldGuideLst xmlns:p15="http://schemas.microsoft.com/office/powerpoint/2012/main"/>
+    </p:ext>
+  </p:extLst>
 </p:presentation>
 </file>
 
@@ -836,7 +842,7 @@
           <a:p>
             <a:fld id="{FE48D15A-1118-4388-BCB0-E431B2FA9AF5}" type="datetimeFigureOut">
               <a:rPr lang="en-US" smtClean="0"/>
-              <a:t>5/10/2025</a:t>
+              <a:t>10-May-25</a:t>
             </a:fld>
             <a:endParaRPr lang="en-US"/>
           </a:p>
@@ -1087,7 +1093,7 @@
           <a:p>
             <a:fld id="{FE48D15A-1118-4388-BCB0-E431B2FA9AF5}" type="datetimeFigureOut">
               <a:rPr lang="en-US" smtClean="0"/>
-              <a:t>5/10/2025</a:t>
+              <a:t>10-May-25</a:t>
             </a:fld>
             <a:endParaRPr lang="en-US"/>
           </a:p>
@@ -1401,7 +1407,7 @@
           <a:p>
             <a:fld id="{FE48D15A-1118-4388-BCB0-E431B2FA9AF5}" type="datetimeFigureOut">
               <a:rPr lang="en-US" smtClean="0"/>
-              <a:t>5/10/2025</a:t>
+              <a:t>10-May-25</a:t>
             </a:fld>
             <a:endParaRPr lang="en-US"/>
           </a:p>
@@ -1742,7 +1748,7 @@
           <a:p>
             <a:fld id="{FE48D15A-1118-4388-BCB0-E431B2FA9AF5}" type="datetimeFigureOut">
               <a:rPr lang="en-US" smtClean="0"/>
-              <a:t>5/10/2025</a:t>
+              <a:t>10-May-25</a:t>
             </a:fld>
             <a:endParaRPr lang="en-US"/>
           </a:p>
@@ -2056,7 +2062,7 @@
           <a:p>
             <a:fld id="{FE48D15A-1118-4388-BCB0-E431B2FA9AF5}" type="datetimeFigureOut">
               <a:rPr lang="en-US" smtClean="0"/>
-              <a:t>5/10/2025</a:t>
+              <a:t>10-May-25</a:t>
             </a:fld>
             <a:endParaRPr lang="en-US"/>
           </a:p>
@@ -2449,7 +2455,7 @@
           <a:p>
             <a:fld id="{FE48D15A-1118-4388-BCB0-E431B2FA9AF5}" type="datetimeFigureOut">
               <a:rPr lang="en-US" smtClean="0"/>
-              <a:t>5/10/2025</a:t>
+              <a:t>10-May-25</a:t>
             </a:fld>
             <a:endParaRPr lang="en-US"/>
           </a:p>
@@ -2619,7 +2625,7 @@
           <a:p>
             <a:fld id="{FE48D15A-1118-4388-BCB0-E431B2FA9AF5}" type="datetimeFigureOut">
               <a:rPr lang="en-US" smtClean="0"/>
-              <a:t>5/10/2025</a:t>
+              <a:t>10-May-25</a:t>
             </a:fld>
             <a:endParaRPr lang="en-US"/>
           </a:p>
@@ -2799,7 +2805,7 @@
           <a:p>
             <a:fld id="{FE48D15A-1118-4388-BCB0-E431B2FA9AF5}" type="datetimeFigureOut">
               <a:rPr lang="en-US" smtClean="0"/>
-              <a:t>5/10/2025</a:t>
+              <a:t>10-May-25</a:t>
             </a:fld>
             <a:endParaRPr lang="en-US"/>
           </a:p>
@@ -2975,7 +2981,7 @@
           <a:p>
             <a:fld id="{FE48D15A-1118-4388-BCB0-E431B2FA9AF5}" type="datetimeFigureOut">
               <a:rPr lang="en-US" smtClean="0"/>
-              <a:t>5/10/2025</a:t>
+              <a:t>10-May-25</a:t>
             </a:fld>
             <a:endParaRPr lang="en-US"/>
           </a:p>
@@ -3222,7 +3228,7 @@
           <a:p>
             <a:fld id="{FE48D15A-1118-4388-BCB0-E431B2FA9AF5}" type="datetimeFigureOut">
               <a:rPr lang="en-US" smtClean="0"/>
-              <a:t>5/10/2025</a:t>
+              <a:t>10-May-25</a:t>
             </a:fld>
             <a:endParaRPr lang="en-US"/>
           </a:p>
@@ -3454,7 +3460,7 @@
           <a:p>
             <a:fld id="{FE48D15A-1118-4388-BCB0-E431B2FA9AF5}" type="datetimeFigureOut">
               <a:rPr lang="en-US" smtClean="0"/>
-              <a:t>5/10/2025</a:t>
+              <a:t>10-May-25</a:t>
             </a:fld>
             <a:endParaRPr lang="en-US"/>
           </a:p>
@@ -3828,7 +3834,7 @@
           <a:p>
             <a:fld id="{FE48D15A-1118-4388-BCB0-E431B2FA9AF5}" type="datetimeFigureOut">
               <a:rPr lang="en-US" smtClean="0"/>
-              <a:t>5/10/2025</a:t>
+              <a:t>10-May-25</a:t>
             </a:fld>
             <a:endParaRPr lang="en-US"/>
           </a:p>
@@ -3951,7 +3957,7 @@
           <a:p>
             <a:fld id="{FE48D15A-1118-4388-BCB0-E431B2FA9AF5}" type="datetimeFigureOut">
               <a:rPr lang="en-US" smtClean="0"/>
-              <a:t>5/10/2025</a:t>
+              <a:t>10-May-25</a:t>
             </a:fld>
             <a:endParaRPr lang="en-US"/>
           </a:p>
@@ -4046,7 +4052,7 @@
           <a:p>
             <a:fld id="{FE48D15A-1118-4388-BCB0-E431B2FA9AF5}" type="datetimeFigureOut">
               <a:rPr lang="en-US" smtClean="0"/>
-              <a:t>5/10/2025</a:t>
+              <a:t>10-May-25</a:t>
             </a:fld>
             <a:endParaRPr lang="en-US"/>
           </a:p>
@@ -4301,7 +4307,7 @@
           <a:p>
             <a:fld id="{FE48D15A-1118-4388-BCB0-E431B2FA9AF5}" type="datetimeFigureOut">
               <a:rPr lang="en-US" smtClean="0"/>
-              <a:t>5/10/2025</a:t>
+              <a:t>10-May-25</a:t>
             </a:fld>
             <a:endParaRPr lang="en-US"/>
           </a:p>
@@ -4564,7 +4570,7 @@
           <a:p>
             <a:fld id="{FE48D15A-1118-4388-BCB0-E431B2FA9AF5}" type="datetimeFigureOut">
               <a:rPr lang="en-US" smtClean="0"/>
-              <a:t>5/10/2025</a:t>
+              <a:t>10-May-25</a:t>
             </a:fld>
             <a:endParaRPr lang="en-US"/>
           </a:p>
@@ -5307,7 +5313,7 @@
           <a:p>
             <a:fld id="{FE48D15A-1118-4388-BCB0-E431B2FA9AF5}" type="datetimeFigureOut">
               <a:rPr lang="en-US" smtClean="0"/>
-              <a:t>5/10/2025</a:t>
+              <a:t>10-May-25</a:t>
             </a:fld>
             <a:endParaRPr lang="en-US"/>
           </a:p>
@@ -6105,35 +6111,35 @@
           </a:p>
         </p:txBody>
       </p:sp>
-      <p:sp>
-        <p:nvSpPr>
-          <p:cNvPr id="3" name="Content Placeholder 2">
+      <p:pic>
+        <p:nvPicPr>
+          <p:cNvPr id="4" name="Content Placeholder 3"/>
+          <p:cNvPicPr>
+            <a:picLocks noGrp="1" noChangeAspect="1"/>
+          </p:cNvPicPr>
+          <p:nvPr>
+            <p:ph idx="1"/>
+          </p:nvPr>
+        </p:nvPicPr>
+        <p:blipFill>
+          <a:blip r:embed="rId2">
             <a:extLst>
-              <a:ext uri="{FF2B5EF4-FFF2-40B4-BE49-F238E27FC236}">
-                <a16:creationId xmlns:a16="http://schemas.microsoft.com/office/drawing/2014/main" id="{ADE15E0C-31B0-B3CA-BD7F-38CCD5E47D97}"/>
+              <a:ext uri="{28A0092B-C50C-407E-A947-70E740481C1C}">
+                <a14:useLocalDpi xmlns:a14="http://schemas.microsoft.com/office/drawing/2010/main" val="0"/>
               </a:ext>
             </a:extLst>
-          </p:cNvPr>
-          <p:cNvSpPr>
-            <a:spLocks noGrp="1"/>
-          </p:cNvSpPr>
-          <p:nvPr>
-            <p:ph idx="1"/>
-          </p:nvPr>
-        </p:nvSpPr>
-        <p:spPr/>
-        <p:txBody>
-          <a:bodyPr/>
-          <a:lstStyle/>
-          <a:p>
-            <a:r>
-              <a:rPr lang="ro-RO" dirty="0"/>
-              <a:t>TODO</a:t>
-            </a:r>
-            <a:endParaRPr lang="en-US" dirty="0"/>
-          </a:p>
-        </p:txBody>
-      </p:sp>
+          </a:blip>
+          <a:stretch>
+            <a:fillRect/>
+          </a:stretch>
+        </p:blipFill>
+        <p:spPr>
+          <a:xfrm>
+            <a:off x="1447195" y="2160588"/>
+            <a:ext cx="7057647" cy="3881437"/>
+          </a:xfrm>
+        </p:spPr>
+      </p:pic>
     </p:spTree>
     <p:extLst>
       <p:ext uri="{BB962C8B-B14F-4D97-AF65-F5344CB8AC3E}">
@@ -7025,6 +7031,10 @@
             <a:r>
               <a:rPr lang="en-US" dirty="0" err="1"/>
               <a:t>Metrici</a:t>
+            </a:r>
+            <a:r>
+              <a:rPr lang="en-US" dirty="0"/>
+              <a:t/>
             </a:r>
             <a:br>
               <a:rPr lang="en-US" dirty="0"/>
@@ -7115,7 +7125,7 @@
                 <a16:creationId xmlns:a16="http://schemas.microsoft.com/office/drawing/2014/main" id="{9F4444CE-BC8D-4D61-B303-4C05614E62AB}"/>
               </a:ext>
               <a:ext uri="{C183D7F6-B498-43B3-948B-1728B52AA6E4}">
-                <adec:decorative xmlns:adec="http://schemas.microsoft.com/office/drawing/2017/decorative" val="1"/>
+                <adec:decorative xmlns:adec="http://schemas.microsoft.com/office/drawing/2017/decorative" xmlns="" val="1"/>
               </a:ext>
             </a:extLst>
           </p:cNvPr>
@@ -7175,7 +7185,7 @@
                 <a16:creationId xmlns:a16="http://schemas.microsoft.com/office/drawing/2014/main" id="{62423CA5-E2E1-4789-B759-9906C1C94063}"/>
               </a:ext>
               <a:ext uri="{C183D7F6-B498-43B3-948B-1728B52AA6E4}">
-                <adec:decorative xmlns:adec="http://schemas.microsoft.com/office/drawing/2017/decorative" val="1"/>
+                <adec:decorative xmlns:adec="http://schemas.microsoft.com/office/drawing/2017/decorative" xmlns="" val="1"/>
               </a:ext>
             </a:extLst>
           </p:cNvPr>
@@ -7236,7 +7246,7 @@
                 <a16:creationId xmlns:a16="http://schemas.microsoft.com/office/drawing/2014/main" id="{73772B81-181F-48B7-8826-4D9686D15DF5}"/>
               </a:ext>
               <a:ext uri="{C183D7F6-B498-43B3-948B-1728B52AA6E4}">
-                <adec:decorative xmlns:adec="http://schemas.microsoft.com/office/drawing/2017/decorative" val="1"/>
+                <adec:decorative xmlns:adec="http://schemas.microsoft.com/office/drawing/2017/decorative" xmlns="" val="1"/>
               </a:ext>
             </a:extLst>
           </p:cNvPr>
@@ -7429,7 +7439,7 @@
                 <a16:creationId xmlns:a16="http://schemas.microsoft.com/office/drawing/2014/main" id="{B2205F6E-03C6-4E92-877C-E2482F6599AA}"/>
               </a:ext>
               <a:ext uri="{C183D7F6-B498-43B3-948B-1728B52AA6E4}">
-                <adec:decorative xmlns:adec="http://schemas.microsoft.com/office/drawing/2017/decorative" val="1"/>
+                <adec:decorative xmlns:adec="http://schemas.microsoft.com/office/drawing/2017/decorative" xmlns="" val="1"/>
               </a:ext>
             </a:extLst>
           </p:cNvPr>
@@ -7545,6 +7555,104 @@
     <p:extLst>
       <p:ext uri="{BB962C8B-B14F-4D97-AF65-F5344CB8AC3E}">
         <p14:creationId xmlns:p14="http://schemas.microsoft.com/office/powerpoint/2010/main" val="2248341555"/>
+      </p:ext>
+    </p:extLst>
+  </p:cSld>
+  <p:clrMapOvr>
+    <a:masterClrMapping/>
+  </p:clrMapOvr>
+</p:sld>
+</file>
+
+<file path=ppt/slides/slide9.xml><?xml version="1.0" encoding="utf-8"?>
+<p:sld xmlns:a="http://schemas.openxmlformats.org/drawingml/2006/main" xmlns:r="http://schemas.openxmlformats.org/officeDocument/2006/relationships" xmlns:p="http://schemas.openxmlformats.org/presentationml/2006/main">
+  <p:cSld>
+    <p:spTree>
+      <p:nvGrpSpPr>
+        <p:cNvPr id="1" name=""/>
+        <p:cNvGrpSpPr/>
+        <p:nvPr/>
+      </p:nvGrpSpPr>
+      <p:grpSpPr>
+        <a:xfrm>
+          <a:off x="0" y="0"/>
+          <a:ext cx="0" cy="0"/>
+          <a:chOff x="0" y="0"/>
+          <a:chExt cx="0" cy="0"/>
+        </a:xfrm>
+      </p:grpSpPr>
+      <p:sp>
+        <p:nvSpPr>
+          <p:cNvPr id="2" name="Title 1"/>
+          <p:cNvSpPr>
+            <a:spLocks noGrp="1"/>
+          </p:cNvSpPr>
+          <p:nvPr>
+            <p:ph type="title"/>
+          </p:nvPr>
+        </p:nvSpPr>
+        <p:spPr/>
+        <p:txBody>
+          <a:bodyPr/>
+          <a:lstStyle/>
+          <a:p>
+            <a:r>
+              <a:rPr lang="en-US" dirty="0" err="1" smtClean="0"/>
+              <a:t>Diagrama</a:t>
+            </a:r>
+            <a:r>
+              <a:rPr lang="en-US" dirty="0" smtClean="0"/>
+              <a:t> </a:t>
+            </a:r>
+            <a:r>
+              <a:rPr lang="en-US" dirty="0" err="1" smtClean="0"/>
+              <a:t>arhitecturii</a:t>
+            </a:r>
+            <a:r>
+              <a:rPr lang="en-US" dirty="0" smtClean="0"/>
+              <a:t> </a:t>
+            </a:r>
+            <a:r>
+              <a:rPr lang="en-US" dirty="0" err="1" smtClean="0"/>
+              <a:t>aplicatiei</a:t>
+            </a:r>
+            <a:endParaRPr lang="en-US" dirty="0"/>
+          </a:p>
+        </p:txBody>
+      </p:sp>
+      <p:pic>
+        <p:nvPicPr>
+          <p:cNvPr id="4" name="Content Placeholder 3"/>
+          <p:cNvPicPr>
+            <a:picLocks noGrp="1" noChangeAspect="1"/>
+          </p:cNvPicPr>
+          <p:nvPr>
+            <p:ph idx="1"/>
+          </p:nvPr>
+        </p:nvPicPr>
+        <p:blipFill>
+          <a:blip r:embed="rId2">
+            <a:extLst>
+              <a:ext uri="{28A0092B-C50C-407E-A947-70E740481C1C}">
+                <a14:useLocalDpi xmlns:a14="http://schemas.microsoft.com/office/drawing/2010/main" val="0"/>
+              </a:ext>
+            </a:extLst>
+          </a:blip>
+          <a:stretch>
+            <a:fillRect/>
+          </a:stretch>
+        </p:blipFill>
+        <p:spPr>
+          <a:xfrm>
+            <a:off x="555121" y="1685732"/>
+            <a:ext cx="7972729" cy="4356294"/>
+          </a:xfrm>
+        </p:spPr>
+      </p:pic>
+    </p:spTree>
+    <p:extLst>
+      <p:ext uri="{BB962C8B-B14F-4D97-AF65-F5344CB8AC3E}">
+        <p14:creationId xmlns:p14="http://schemas.microsoft.com/office/powerpoint/2010/main" val="1427613747"/>
       </p:ext>
     </p:extLst>
   </p:cSld>

</xml_diff>